<commit_message>
Fixed: Not working properly on IGCSE papers
</commit_message>
<xml_diff>
--- a/ppts/5054_s05_qp_1_mcq.pptx
+++ b/ppts/5054_s05_qp_1_mcq.pptx
@@ -3236,7 +3236,7 @@
         <p:spPr>
           <a:xfrm>
             <a:off x="365760" y="731520"/>
-            <a:ext cx="8229600" cy="3307632"/>
+            <a:ext cx="8229600" cy="4070932"/>
           </a:xfrm>
           <a:prstGeom prst="rect">
             <a:avLst/>
@@ -3313,7 +3313,7 @@
         <p:spPr>
           <a:xfrm>
             <a:off x="365760" y="731520"/>
-            <a:ext cx="8229600" cy="3043523"/>
+            <a:ext cx="8229600" cy="3543452"/>
           </a:xfrm>
           <a:prstGeom prst="rect">
             <a:avLst/>
@@ -3390,7 +3390,7 @@
         <p:spPr>
           <a:xfrm>
             <a:off x="365760" y="731520"/>
-            <a:ext cx="8229600" cy="4629774"/>
+            <a:ext cx="8229600" cy="5589728"/>
           </a:xfrm>
           <a:prstGeom prst="rect">
             <a:avLst/>
@@ -3467,7 +3467,7 @@
         <p:spPr>
           <a:xfrm>
             <a:off x="365760" y="731520"/>
-            <a:ext cx="8229600" cy="2561981"/>
+            <a:ext cx="8229600" cy="3153207"/>
           </a:xfrm>
           <a:prstGeom prst="rect">
             <a:avLst/>
@@ -3544,7 +3544,7 @@
         <p:spPr>
           <a:xfrm>
             <a:off x="365760" y="731520"/>
-            <a:ext cx="8229600" cy="1620202"/>
+            <a:ext cx="8229600" cy="2275998"/>
           </a:xfrm>
           <a:prstGeom prst="rect">
             <a:avLst/>
@@ -3621,7 +3621,7 @@
         <p:spPr>
           <a:xfrm>
             <a:off x="365760" y="731520"/>
-            <a:ext cx="8229600" cy="3599376"/>
+            <a:ext cx="8229600" cy="4355331"/>
           </a:xfrm>
           <a:prstGeom prst="rect">
             <a:avLst/>
@@ -3698,7 +3698,7 @@
         <p:spPr>
           <a:xfrm>
             <a:off x="365760" y="731520"/>
-            <a:ext cx="8229600" cy="5507610"/>
+            <a:ext cx="7879670" cy="5943600"/>
           </a:xfrm>
           <a:prstGeom prst="rect">
             <a:avLst/>
@@ -3775,7 +3775,7 @@
         <p:spPr>
           <a:xfrm>
             <a:off x="365760" y="731520"/>
-            <a:ext cx="8229600" cy="2589272"/>
+            <a:ext cx="8229600" cy="3193986"/>
           </a:xfrm>
           <a:prstGeom prst="rect">
             <a:avLst/>
@@ -3852,7 +3852,7 @@
         <p:spPr>
           <a:xfrm>
             <a:off x="365760" y="731520"/>
-            <a:ext cx="8229600" cy="5740942"/>
+            <a:ext cx="7844504" cy="5943600"/>
           </a:xfrm>
           <a:prstGeom prst="rect">
             <a:avLst/>
@@ -3929,7 +3929,7 @@
         <p:spPr>
           <a:xfrm>
             <a:off x="365760" y="731520"/>
-            <a:ext cx="8229600" cy="5637735"/>
+            <a:ext cx="7917428" cy="5943600"/>
           </a:xfrm>
           <a:prstGeom prst="rect">
             <a:avLst/>
@@ -4006,7 +4006,7 @@
         <p:spPr>
           <a:xfrm>
             <a:off x="365760" y="731520"/>
-            <a:ext cx="8229600" cy="2092083"/>
+            <a:ext cx="8229600" cy="2574871"/>
           </a:xfrm>
           <a:prstGeom prst="rect">
             <a:avLst/>
@@ -4083,7 +4083,7 @@
         <p:spPr>
           <a:xfrm>
             <a:off x="365760" y="731520"/>
-            <a:ext cx="6493837" cy="5943600"/>
+            <a:ext cx="5981853" cy="5943600"/>
           </a:xfrm>
           <a:prstGeom prst="rect">
             <a:avLst/>
@@ -4160,7 +4160,7 @@
         <p:spPr>
           <a:xfrm>
             <a:off x="365760" y="731520"/>
-            <a:ext cx="8229600" cy="3659623"/>
+            <a:ext cx="8229600" cy="4254387"/>
           </a:xfrm>
           <a:prstGeom prst="rect">
             <a:avLst/>
@@ -4237,7 +4237,7 @@
         <p:spPr>
           <a:xfrm>
             <a:off x="365760" y="731520"/>
-            <a:ext cx="8229600" cy="3752214"/>
+            <a:ext cx="8229600" cy="4268624"/>
           </a:xfrm>
           <a:prstGeom prst="rect">
             <a:avLst/>
@@ -4314,7 +4314,7 @@
         <p:spPr>
           <a:xfrm>
             <a:off x="365760" y="731520"/>
-            <a:ext cx="8063725" cy="5943600"/>
+            <a:ext cx="7374262" cy="5943600"/>
           </a:xfrm>
           <a:prstGeom prst="rect">
             <a:avLst/>
@@ -4391,7 +4391,7 @@
         <p:spPr>
           <a:xfrm>
             <a:off x="365760" y="731520"/>
-            <a:ext cx="8229600" cy="3383379"/>
+            <a:ext cx="8229600" cy="4164159"/>
           </a:xfrm>
           <a:prstGeom prst="rect">
             <a:avLst/>
@@ -4468,7 +4468,7 @@
         <p:spPr>
           <a:xfrm>
             <a:off x="365760" y="731520"/>
-            <a:ext cx="8229600" cy="5477243"/>
+            <a:ext cx="8153400" cy="5943600"/>
           </a:xfrm>
           <a:prstGeom prst="rect">
             <a:avLst/>
@@ -4545,7 +4545,7 @@
         <p:spPr>
           <a:xfrm>
             <a:off x="365760" y="731520"/>
-            <a:ext cx="8229600" cy="3611788"/>
+            <a:ext cx="8229600" cy="4123046"/>
           </a:xfrm>
           <a:prstGeom prst="rect">
             <a:avLst/>
@@ -4622,7 +4622,7 @@
         <p:spPr>
           <a:xfrm>
             <a:off x="365760" y="731520"/>
-            <a:ext cx="8229600" cy="5718967"/>
+            <a:ext cx="7837599" cy="5943600"/>
           </a:xfrm>
           <a:prstGeom prst="rect">
             <a:avLst/>
@@ -4699,7 +4699,7 @@
         <p:spPr>
           <a:xfrm>
             <a:off x="365760" y="731520"/>
-            <a:ext cx="8229600" cy="3123746"/>
+            <a:ext cx="8229600" cy="3747094"/>
           </a:xfrm>
           <a:prstGeom prst="rect">
             <a:avLst/>
@@ -4776,7 +4776,7 @@
         <p:spPr>
           <a:xfrm>
             <a:off x="365760" y="731520"/>
-            <a:ext cx="8229600" cy="4616334"/>
+            <a:ext cx="8229600" cy="5142807"/>
           </a:xfrm>
           <a:prstGeom prst="rect">
             <a:avLst/>
@@ -4853,7 +4853,7 @@
         <p:spPr>
           <a:xfrm>
             <a:off x="365760" y="731520"/>
-            <a:ext cx="8229600" cy="2353676"/>
+            <a:ext cx="8229600" cy="2866304"/>
           </a:xfrm>
           <a:prstGeom prst="rect">
             <a:avLst/>
@@ -4930,7 +4930,7 @@
         <p:spPr>
           <a:xfrm>
             <a:off x="365760" y="731520"/>
-            <a:ext cx="8229600" cy="5793526"/>
+            <a:ext cx="7641771" cy="5943600"/>
           </a:xfrm>
           <a:prstGeom prst="rect">
             <a:avLst/>
@@ -5007,7 +5007,7 @@
         <p:spPr>
           <a:xfrm>
             <a:off x="365760" y="731520"/>
-            <a:ext cx="8229600" cy="5162203"/>
+            <a:ext cx="8229600" cy="5714680"/>
           </a:xfrm>
           <a:prstGeom prst="rect">
             <a:avLst/>
@@ -5084,7 +5084,7 @@
         <p:spPr>
           <a:xfrm>
             <a:off x="365760" y="731520"/>
-            <a:ext cx="8229600" cy="5504290"/>
+            <a:ext cx="8088923" cy="5943600"/>
           </a:xfrm>
           <a:prstGeom prst="rect">
             <a:avLst/>
@@ -5161,7 +5161,7 @@
         <p:spPr>
           <a:xfrm>
             <a:off x="365760" y="731520"/>
-            <a:ext cx="8229600" cy="3875663"/>
+            <a:ext cx="8229600" cy="4386921"/>
           </a:xfrm>
           <a:prstGeom prst="rect">
             <a:avLst/>
@@ -5238,7 +5238,7 @@
         <p:spPr>
           <a:xfrm>
             <a:off x="365760" y="731520"/>
-            <a:ext cx="8229600" cy="5559649"/>
+            <a:ext cx="7879214" cy="5943600"/>
           </a:xfrm>
           <a:prstGeom prst="rect">
             <a:avLst/>
@@ -5315,7 +5315,7 @@
         <p:spPr>
           <a:xfrm>
             <a:off x="365760" y="731520"/>
-            <a:ext cx="8229600" cy="2450201"/>
+            <a:ext cx="8229600" cy="2939142"/>
           </a:xfrm>
           <a:prstGeom prst="rect">
             <a:avLst/>
@@ -5392,7 +5392,7 @@
         <p:spPr>
           <a:xfrm>
             <a:off x="365760" y="731520"/>
-            <a:ext cx="8229600" cy="3268389"/>
+            <a:ext cx="8229600" cy="3920601"/>
           </a:xfrm>
           <a:prstGeom prst="rect">
             <a:avLst/>
@@ -5469,7 +5469,7 @@
         <p:spPr>
           <a:xfrm>
             <a:off x="365760" y="731520"/>
-            <a:ext cx="8229600" cy="4679792"/>
+            <a:ext cx="8229600" cy="5236517"/>
           </a:xfrm>
           <a:prstGeom prst="rect">
             <a:avLst/>
@@ -5546,7 +5546,7 @@
         <p:spPr>
           <a:xfrm>
             <a:off x="365760" y="731520"/>
-            <a:ext cx="8229600" cy="4309957"/>
+            <a:ext cx="8229600" cy="4898178"/>
           </a:xfrm>
           <a:prstGeom prst="rect">
             <a:avLst/>
@@ -5623,7 +5623,7 @@
         <p:spPr>
           <a:xfrm>
             <a:off x="365760" y="731520"/>
-            <a:ext cx="8229600" cy="5334406"/>
+            <a:ext cx="8229600" cy="5883779"/>
           </a:xfrm>
           <a:prstGeom prst="rect">
             <a:avLst/>
@@ -5700,7 +5700,7 @@
         <p:spPr>
           <a:xfrm>
             <a:off x="365760" y="731520"/>
-            <a:ext cx="8229600" cy="5151058"/>
+            <a:ext cx="8229600" cy="5766767"/>
           </a:xfrm>
           <a:prstGeom prst="rect">
             <a:avLst/>
@@ -5777,7 +5777,7 @@
         <p:spPr>
           <a:xfrm>
             <a:off x="365760" y="731520"/>
-            <a:ext cx="8229600" cy="4202142"/>
+            <a:ext cx="8229600" cy="5192023"/>
           </a:xfrm>
           <a:prstGeom prst="rect">
             <a:avLst/>
@@ -5854,7 +5854,7 @@
         <p:spPr>
           <a:xfrm>
             <a:off x="365760" y="731520"/>
-            <a:ext cx="8229600" cy="2829268"/>
+            <a:ext cx="8229600" cy="3323703"/>
           </a:xfrm>
           <a:prstGeom prst="rect">
             <a:avLst/>
@@ -5931,7 +5931,7 @@
         <p:spPr>
           <a:xfrm>
             <a:off x="365760" y="731520"/>
-            <a:ext cx="8229600" cy="3170870"/>
+            <a:ext cx="8229600" cy="3763499"/>
           </a:xfrm>
           <a:prstGeom prst="rect">
             <a:avLst/>
@@ -6008,7 +6008,7 @@
         <p:spPr>
           <a:xfrm>
             <a:off x="365760" y="731520"/>
-            <a:ext cx="8229600" cy="3114942"/>
+            <a:ext cx="8229600" cy="3680795"/>
           </a:xfrm>
           <a:prstGeom prst="rect">
             <a:avLst/>
@@ -6085,7 +6085,7 @@
         <p:spPr>
           <a:xfrm>
             <a:off x="365760" y="731520"/>
-            <a:ext cx="8229600" cy="3958124"/>
+            <a:ext cx="8229600" cy="4502366"/>
           </a:xfrm>
           <a:prstGeom prst="rect">
             <a:avLst/>
@@ -6162,7 +6162,7 @@
         <p:spPr>
           <a:xfrm>
             <a:off x="365760" y="731520"/>
-            <a:ext cx="8229600" cy="3732647"/>
+            <a:ext cx="8229600" cy="4254033"/>
           </a:xfrm>
           <a:prstGeom prst="rect">
             <a:avLst/>
@@ -6239,7 +6239,7 @@
         <p:spPr>
           <a:xfrm>
             <a:off x="365760" y="731520"/>
-            <a:ext cx="8229600" cy="3773794"/>
+            <a:ext cx="8229600" cy="4442814"/>
           </a:xfrm>
           <a:prstGeom prst="rect">
             <a:avLst/>

</xml_diff>